<commit_message>
PP update/ Comments update
</commit_message>
<xml_diff>
--- a/Presentatie.pptx
+++ b/Presentatie.pptx
@@ -5812,6 +5812,26 @@
             </a:r>
           </a:p>
           <a:p>
+            <a:r>
+              <a:rPr lang="nl-NL" dirty="0" smtClean="0"/>
+              <a:t>10x10 </a:t>
+            </a:r>
+            <a:r>
+              <a:rPr lang="nl-NL" dirty="0" err="1" smtClean="0"/>
+              <a:t>neighbourhood</a:t>
+            </a:r>
+            <a:r>
+              <a:rPr lang="nl-NL" dirty="0" smtClean="0"/>
+              <a:t> pixels</a:t>
+            </a:r>
+          </a:p>
+          <a:p>
+            <a:endParaRPr lang="nl-NL" dirty="0" smtClean="0"/>
+          </a:p>
+          <a:p>
+            <a:endParaRPr lang="nl-NL" dirty="0" smtClean="0"/>
+          </a:p>
+          <a:p>
             <a:endParaRPr lang="nl-NL" dirty="0" smtClean="0"/>
           </a:p>
           <a:p>
@@ -6080,8 +6100,13 @@
           <a:p>
             <a:r>
               <a:rPr lang="nl-NL" dirty="0"/>
-              <a:t>“Storend licht” neutraliseer algoritme</a:t>
-            </a:r>
+              <a:t>“Storend licht” neutraliseer </a:t>
+            </a:r>
+            <a:r>
+              <a:rPr lang="nl-NL" dirty="0" smtClean="0"/>
+              <a:t>algoritme resultaten</a:t>
+            </a:r>
+            <a:endParaRPr lang="nl-NL" dirty="0"/>
           </a:p>
         </p:txBody>
       </p:sp>
@@ -6102,14 +6127,10 @@
           <a:p>
             <a:r>
               <a:rPr lang="nl-NL" dirty="0" smtClean="0"/>
-              <a:t>Testresultaten</a:t>
-            </a:r>
-          </a:p>
-          <a:p>
-            <a:r>
-              <a:rPr lang="nl-NL" dirty="0" smtClean="0"/>
               <a:t>Origineel:</a:t>
             </a:r>
+          </a:p>
+          <a:p>
             <a:endParaRPr lang="nl-NL" dirty="0"/>
           </a:p>
           <a:p>
@@ -6157,8 +6178,8 @@
         </p:blipFill>
         <p:spPr>
           <a:xfrm>
-            <a:off x="4876044" y="3108643"/>
-            <a:ext cx="2790384" cy="867544"/>
+            <a:off x="-1141429874" y="-1031904165"/>
+            <a:ext cx="135376098" cy="135376098"/>
           </a:xfrm>
           <a:prstGeom prst="rect">
             <a:avLst/>
@@ -6205,7 +6226,7 @@
         </p:blipFill>
         <p:spPr>
           <a:xfrm>
-            <a:off x="4876044" y="4136830"/>
+            <a:off x="4876044" y="4193530"/>
             <a:ext cx="2790384" cy="667266"/>
           </a:xfrm>
           <a:prstGeom prst="rect">
@@ -6235,8 +6256,38 @@
         </p:blipFill>
         <p:spPr>
           <a:xfrm rot="10800000" flipH="1" flipV="1">
-            <a:off x="4876044" y="5019125"/>
+            <a:off x="4876044" y="5064485"/>
             <a:ext cx="2790384" cy="701212"/>
+          </a:xfrm>
+          <a:prstGeom prst="rect">
+            <a:avLst/>
+          </a:prstGeom>
+        </p:spPr>
+      </p:pic>
+      <p:pic>
+        <p:nvPicPr>
+          <p:cNvPr id="8" name="Afbeelding 7" descr="Schermafbeelding 2014-04-14 om 15.22.36.png"/>
+          <p:cNvPicPr>
+            <a:picLocks noChangeAspect="1"/>
+          </p:cNvPicPr>
+          <p:nvPr/>
+        </p:nvPicPr>
+        <p:blipFill>
+          <a:blip r:embed="rId6">
+            <a:extLst>
+              <a:ext uri="{28A0092B-C50C-407E-A947-70E740481C1C}">
+                <a14:useLocalDpi xmlns:a14="http://schemas.microsoft.com/office/drawing/2010/main" val="0"/>
+              </a:ext>
+            </a:extLst>
+          </a:blip>
+          <a:stretch>
+            <a:fillRect/>
+          </a:stretch>
+        </p:blipFill>
+        <p:spPr>
+          <a:xfrm>
+            <a:off x="4876044" y="3059735"/>
+            <a:ext cx="2835743" cy="966977"/>
           </a:xfrm>
           <a:prstGeom prst="rect">
             <a:avLst/>

</xml_diff>